<commit_message>
Update EDA_Presentation - AL.pptx
</commit_message>
<xml_diff>
--- a/EDA_Presentation - AL.pptx
+++ b/EDA_Presentation - AL.pptx
@@ -5330,7 +5330,7 @@
           <a:p>
             <a:pPr algn="ctr"/>
             <a:r>
-              <a:rPr lang="en-US" sz="5400" kern="1200">
+              <a:rPr lang="en-US" sz="5400" kern="1200" dirty="0">
                 <a:solidFill>
                   <a:srgbClr val="FFFFFF"/>
                 </a:solidFill>
@@ -5338,7 +5338,7 @@
                 <a:ea typeface="+mj-ea"/>
                 <a:cs typeface="+mj-cs"/>
               </a:rPr>
-              <a:t>Median ABV / IBU by State</a:t>
+              <a:t>Mean IBU by State</a:t>
             </a:r>
           </a:p>
         </p:txBody>

</xml_diff>